<commit_message>
preparazione ppt risultati BRT
</commit_message>
<xml_diff>
--- a/Analysis of vital rates.pptx
+++ b/Analysis of vital rates.pptx
@@ -9,6 +9,10 @@
     <p:sldId id="258" r:id="rId3"/>
     <p:sldId id="260" r:id="rId4"/>
     <p:sldId id="261" r:id="rId5"/>
+    <p:sldId id="262" r:id="rId6"/>
+    <p:sldId id="263" r:id="rId7"/>
+    <p:sldId id="265" r:id="rId8"/>
+    <p:sldId id="266" r:id="rId9"/>
   </p:sldIdLst>
   <p:sldSz cx="12192000" cy="6858000"/>
   <p:notesSz cx="6858000" cy="9144000"/>
@@ -107,6 +111,11 @@
       </a:defRPr>
     </a:lvl9pPr>
   </p:defaultTextStyle>
+  <p:extLst>
+    <p:ext uri="{EFAFB233-063F-42B5-8137-9DF3F51BA10A}">
+      <p15:sldGuideLst xmlns:p15="http://schemas.microsoft.com/office/powerpoint/2012/main"/>
+    </p:ext>
+  </p:extLst>
 </p:presentation>
 </file>
 
@@ -257,7 +266,7 @@
           <a:p>
             <a:fld id="{02C2ADA2-978C-4CD7-AE45-74DF746C4DF2}" type="datetimeFigureOut">
               <a:rPr lang="it-IT" smtClean="0"/>
-              <a:t>10/11/2023</a:t>
+              <a:t>22/11/2023</a:t>
             </a:fld>
             <a:endParaRPr lang="it-IT"/>
           </a:p>
@@ -455,7 +464,7 @@
           <a:p>
             <a:fld id="{02C2ADA2-978C-4CD7-AE45-74DF746C4DF2}" type="datetimeFigureOut">
               <a:rPr lang="it-IT" smtClean="0"/>
-              <a:t>10/11/2023</a:t>
+              <a:t>22/11/2023</a:t>
             </a:fld>
             <a:endParaRPr lang="it-IT"/>
           </a:p>
@@ -663,7 +672,7 @@
           <a:p>
             <a:fld id="{02C2ADA2-978C-4CD7-AE45-74DF746C4DF2}" type="datetimeFigureOut">
               <a:rPr lang="it-IT" smtClean="0"/>
-              <a:t>10/11/2023</a:t>
+              <a:t>22/11/2023</a:t>
             </a:fld>
             <a:endParaRPr lang="it-IT"/>
           </a:p>
@@ -861,7 +870,7 @@
           <a:p>
             <a:fld id="{02C2ADA2-978C-4CD7-AE45-74DF746C4DF2}" type="datetimeFigureOut">
               <a:rPr lang="it-IT" smtClean="0"/>
-              <a:t>10/11/2023</a:t>
+              <a:t>22/11/2023</a:t>
             </a:fld>
             <a:endParaRPr lang="it-IT"/>
           </a:p>
@@ -1136,7 +1145,7 @@
           <a:p>
             <a:fld id="{02C2ADA2-978C-4CD7-AE45-74DF746C4DF2}" type="datetimeFigureOut">
               <a:rPr lang="it-IT" smtClean="0"/>
-              <a:t>10/11/2023</a:t>
+              <a:t>22/11/2023</a:t>
             </a:fld>
             <a:endParaRPr lang="it-IT"/>
           </a:p>
@@ -1401,7 +1410,7 @@
           <a:p>
             <a:fld id="{02C2ADA2-978C-4CD7-AE45-74DF746C4DF2}" type="datetimeFigureOut">
               <a:rPr lang="it-IT" smtClean="0"/>
-              <a:t>10/11/2023</a:t>
+              <a:t>22/11/2023</a:t>
             </a:fld>
             <a:endParaRPr lang="it-IT"/>
           </a:p>
@@ -1813,7 +1822,7 @@
           <a:p>
             <a:fld id="{02C2ADA2-978C-4CD7-AE45-74DF746C4DF2}" type="datetimeFigureOut">
               <a:rPr lang="it-IT" smtClean="0"/>
-              <a:t>10/11/2023</a:t>
+              <a:t>22/11/2023</a:t>
             </a:fld>
             <a:endParaRPr lang="it-IT"/>
           </a:p>
@@ -1954,7 +1963,7 @@
           <a:p>
             <a:fld id="{02C2ADA2-978C-4CD7-AE45-74DF746C4DF2}" type="datetimeFigureOut">
               <a:rPr lang="it-IT" smtClean="0"/>
-              <a:t>10/11/2023</a:t>
+              <a:t>22/11/2023</a:t>
             </a:fld>
             <a:endParaRPr lang="it-IT"/>
           </a:p>
@@ -2067,7 +2076,7 @@
           <a:p>
             <a:fld id="{02C2ADA2-978C-4CD7-AE45-74DF746C4DF2}" type="datetimeFigureOut">
               <a:rPr lang="it-IT" smtClean="0"/>
-              <a:t>10/11/2023</a:t>
+              <a:t>22/11/2023</a:t>
             </a:fld>
             <a:endParaRPr lang="it-IT"/>
           </a:p>
@@ -2378,7 +2387,7 @@
           <a:p>
             <a:fld id="{02C2ADA2-978C-4CD7-AE45-74DF746C4DF2}" type="datetimeFigureOut">
               <a:rPr lang="it-IT" smtClean="0"/>
-              <a:t>10/11/2023</a:t>
+              <a:t>22/11/2023</a:t>
             </a:fld>
             <a:endParaRPr lang="it-IT"/>
           </a:p>
@@ -2666,7 +2675,7 @@
           <a:p>
             <a:fld id="{02C2ADA2-978C-4CD7-AE45-74DF746C4DF2}" type="datetimeFigureOut">
               <a:rPr lang="it-IT" smtClean="0"/>
-              <a:t>10/11/2023</a:t>
+              <a:t>22/11/2023</a:t>
             </a:fld>
             <a:endParaRPr lang="it-IT"/>
           </a:p>
@@ -2907,7 +2916,7 @@
           <a:p>
             <a:fld id="{02C2ADA2-978C-4CD7-AE45-74DF746C4DF2}" type="datetimeFigureOut">
               <a:rPr lang="it-IT" smtClean="0"/>
-              <a:t>10/11/2023</a:t>
+              <a:t>22/11/2023</a:t>
             </a:fld>
             <a:endParaRPr lang="it-IT"/>
           </a:p>
@@ -4422,6 +4431,1275 @@
 </p:sld>
 </file>
 
+<file path=ppt/slides/slide5.xml><?xml version="1.0" encoding="utf-8"?>
+<p:sld xmlns:a="http://schemas.openxmlformats.org/drawingml/2006/main" xmlns:r="http://schemas.openxmlformats.org/officeDocument/2006/relationships" xmlns:p="http://schemas.openxmlformats.org/presentationml/2006/main">
+  <p:cSld>
+    <p:spTree>
+      <p:nvGrpSpPr>
+        <p:cNvPr id="1" name=""/>
+        <p:cNvGrpSpPr/>
+        <p:nvPr/>
+      </p:nvGrpSpPr>
+      <p:grpSpPr>
+        <a:xfrm>
+          <a:off x="0" y="0"/>
+          <a:ext cx="0" cy="0"/>
+          <a:chOff x="0" y="0"/>
+          <a:chExt cx="0" cy="0"/>
+        </a:xfrm>
+      </p:grpSpPr>
+      <p:sp>
+        <p:nvSpPr>
+          <p:cNvPr id="2" name="Titolo 1">
+            <a:extLst>
+              <a:ext uri="{FF2B5EF4-FFF2-40B4-BE49-F238E27FC236}">
+                <a16:creationId xmlns:a16="http://schemas.microsoft.com/office/drawing/2014/main" id="{8C2469D3-2E4D-6C30-822D-6300BC3406F1}"/>
+              </a:ext>
+            </a:extLst>
+          </p:cNvPr>
+          <p:cNvSpPr>
+            <a:spLocks noGrp="1"/>
+          </p:cNvSpPr>
+          <p:nvPr>
+            <p:ph type="title"/>
+          </p:nvPr>
+        </p:nvSpPr>
+        <p:spPr>
+          <a:xfrm>
+            <a:off x="838200" y="365125"/>
+            <a:ext cx="10515600" cy="549275"/>
+          </a:xfrm>
+        </p:spPr>
+        <p:txBody>
+          <a:bodyPr>
+            <a:normAutofit fontScale="90000"/>
+          </a:bodyPr>
+          <a:lstStyle/>
+          <a:p>
+            <a:r>
+              <a:rPr lang="it-IT" dirty="0" err="1"/>
+              <a:t>Boosted</a:t>
+            </a:r>
+            <a:r>
+              <a:rPr lang="it-IT" dirty="0"/>
+              <a:t> </a:t>
+            </a:r>
+            <a:r>
+              <a:rPr lang="it-IT" dirty="0" err="1"/>
+              <a:t>Regression</a:t>
+            </a:r>
+            <a:r>
+              <a:rPr lang="it-IT" dirty="0"/>
+              <a:t> </a:t>
+            </a:r>
+            <a:r>
+              <a:rPr lang="it-IT" dirty="0" err="1"/>
+              <a:t>Trees</a:t>
+            </a:r>
+            <a:endParaRPr lang="it-IT" dirty="0"/>
+          </a:p>
+        </p:txBody>
+      </p:sp>
+      <p:sp>
+        <p:nvSpPr>
+          <p:cNvPr id="3" name="Segnaposto contenuto 2">
+            <a:extLst>
+              <a:ext uri="{FF2B5EF4-FFF2-40B4-BE49-F238E27FC236}">
+                <a16:creationId xmlns:a16="http://schemas.microsoft.com/office/drawing/2014/main" id="{5BD72E2D-0E3D-D4EA-49B4-9DB3BA2BD56C}"/>
+              </a:ext>
+            </a:extLst>
+          </p:cNvPr>
+          <p:cNvSpPr>
+            <a:spLocks noGrp="1"/>
+          </p:cNvSpPr>
+          <p:nvPr>
+            <p:ph idx="1"/>
+          </p:nvPr>
+        </p:nvSpPr>
+        <p:spPr>
+          <a:xfrm>
+            <a:off x="838200" y="1260629"/>
+            <a:ext cx="10515600" cy="4916334"/>
+          </a:xfrm>
+        </p:spPr>
+        <p:txBody>
+          <a:bodyPr>
+            <a:normAutofit/>
+          </a:bodyPr>
+          <a:lstStyle/>
+          <a:p>
+            <a:pPr marL="0" indent="0">
+              <a:buNone/>
+            </a:pPr>
+            <a:r>
+              <a:rPr lang="it-IT" sz="2000" dirty="0" err="1"/>
+              <a:t>Francon</a:t>
+            </a:r>
+            <a:r>
+              <a:rPr lang="it-IT" sz="2000" dirty="0"/>
+              <a:t> et al 2020:</a:t>
+            </a:r>
+          </a:p>
+          <a:p>
+            <a:pPr marL="457200" indent="-457200">
+              <a:buFont typeface="+mj-lt"/>
+              <a:buAutoNum type="arabicPeriod"/>
+            </a:pPr>
+            <a:r>
+              <a:rPr lang="it-IT" sz="2000" dirty="0" err="1"/>
+              <a:t>bootstrapped</a:t>
+            </a:r>
+            <a:r>
+              <a:rPr lang="it-IT" sz="2000" dirty="0"/>
+              <a:t> </a:t>
+            </a:r>
+            <a:r>
+              <a:rPr lang="it-IT" sz="2000" dirty="0" err="1"/>
+              <a:t>correlation</a:t>
+            </a:r>
+            <a:r>
+              <a:rPr lang="it-IT" sz="2000" dirty="0"/>
+              <a:t> </a:t>
+            </a:r>
+            <a:r>
+              <a:rPr lang="it-IT" sz="2000" dirty="0" err="1"/>
+              <a:t>functions</a:t>
+            </a:r>
+            <a:r>
+              <a:rPr lang="it-IT" sz="2000" dirty="0"/>
+              <a:t> (</a:t>
+            </a:r>
+            <a:r>
+              <a:rPr lang="it-IT" sz="2000" dirty="0" err="1"/>
+              <a:t>implemented</a:t>
+            </a:r>
+            <a:r>
+              <a:rPr lang="it-IT" sz="2000" dirty="0"/>
+              <a:t> in the R package </a:t>
+            </a:r>
+            <a:r>
+              <a:rPr lang="it-IT" sz="2000" dirty="0" err="1">
+                <a:solidFill>
+                  <a:schemeClr val="accent1"/>
+                </a:solidFill>
+                <a:latin typeface="Calibri" panose="020F0502020204030204" pitchFamily="34" charset="0"/>
+                <a:cs typeface="Calibri" panose="020F0502020204030204" pitchFamily="34" charset="0"/>
+              </a:rPr>
+              <a:t>treeclim</a:t>
+            </a:r>
+            <a:r>
+              <a:rPr lang="it-IT" sz="2000" dirty="0"/>
+              <a:t> </a:t>
+            </a:r>
+            <a:r>
+              <a:rPr lang="it-IT" sz="2000" dirty="0" err="1"/>
+              <a:t>as</a:t>
+            </a:r>
+            <a:r>
+              <a:rPr lang="it-IT" sz="2000" dirty="0"/>
+              <a:t> an </a:t>
+            </a:r>
+            <a:r>
+              <a:rPr lang="it-IT" sz="2000" i="1" dirty="0"/>
+              <a:t>ad-hoc </a:t>
+            </a:r>
+            <a:r>
+              <a:rPr lang="it-IT" sz="2000" dirty="0" err="1"/>
+              <a:t>method</a:t>
+            </a:r>
+            <a:r>
+              <a:rPr lang="it-IT" sz="2000" dirty="0"/>
+              <a:t> for ring </a:t>
+            </a:r>
+            <a:r>
+              <a:rPr lang="it-IT" sz="2000" dirty="0" err="1"/>
+              <a:t>tree</a:t>
+            </a:r>
+            <a:r>
+              <a:rPr lang="it-IT" sz="2000" dirty="0"/>
+              <a:t> </a:t>
+            </a:r>
+            <a:r>
+              <a:rPr lang="it-IT" sz="2000" dirty="0" err="1"/>
+              <a:t>analysis</a:t>
+            </a:r>
+            <a:r>
+              <a:rPr lang="it-IT" sz="2000" dirty="0"/>
+              <a:t>) </a:t>
+            </a:r>
+            <a:r>
+              <a:rPr lang="it-IT" sz="2000" dirty="0">
+                <a:solidFill>
+                  <a:srgbClr val="FF0000"/>
+                </a:solidFill>
+                <a:sym typeface="Wingdings" panose="05000000000000000000" pitchFamily="2" charset="2"/>
+              </a:rPr>
+              <a:t> not </a:t>
+            </a:r>
+            <a:r>
+              <a:rPr lang="it-IT" sz="2000" dirty="0" err="1">
+                <a:solidFill>
+                  <a:srgbClr val="FF0000"/>
+                </a:solidFill>
+                <a:sym typeface="Wingdings" panose="05000000000000000000" pitchFamily="2" charset="2"/>
+              </a:rPr>
+              <a:t>directly</a:t>
+            </a:r>
+            <a:r>
+              <a:rPr lang="it-IT" sz="2000" dirty="0">
+                <a:solidFill>
+                  <a:srgbClr val="FF0000"/>
+                </a:solidFill>
+                <a:sym typeface="Wingdings" panose="05000000000000000000" pitchFamily="2" charset="2"/>
+              </a:rPr>
+              <a:t> </a:t>
+            </a:r>
+            <a:r>
+              <a:rPr lang="it-IT" sz="2000" dirty="0" err="1">
+                <a:solidFill>
+                  <a:srgbClr val="FF0000"/>
+                </a:solidFill>
+                <a:sym typeface="Wingdings" panose="05000000000000000000" pitchFamily="2" charset="2"/>
+              </a:rPr>
+              <a:t>applicable</a:t>
+            </a:r>
+            <a:r>
+              <a:rPr lang="it-IT" sz="2000" dirty="0">
+                <a:solidFill>
+                  <a:srgbClr val="FF0000"/>
+                </a:solidFill>
+                <a:sym typeface="Wingdings" panose="05000000000000000000" pitchFamily="2" charset="2"/>
+              </a:rPr>
+              <a:t> to </a:t>
+            </a:r>
+            <a:r>
+              <a:rPr lang="it-IT" sz="2000" dirty="0" err="1">
+                <a:solidFill>
+                  <a:srgbClr val="FF0000"/>
+                </a:solidFill>
+                <a:sym typeface="Wingdings" panose="05000000000000000000" pitchFamily="2" charset="2"/>
+              </a:rPr>
+              <a:t>our</a:t>
+            </a:r>
+            <a:r>
+              <a:rPr lang="it-IT" sz="2000" dirty="0">
+                <a:solidFill>
+                  <a:srgbClr val="FF0000"/>
+                </a:solidFill>
+                <a:sym typeface="Wingdings" panose="05000000000000000000" pitchFamily="2" charset="2"/>
+              </a:rPr>
+              <a:t> dataset</a:t>
+            </a:r>
+            <a:endParaRPr lang="it-IT" sz="2000" dirty="0">
+              <a:solidFill>
+                <a:srgbClr val="FF0000"/>
+              </a:solidFill>
+            </a:endParaRPr>
+          </a:p>
+          <a:p>
+            <a:pPr marL="457200" indent="-457200">
+              <a:buFont typeface="+mj-lt"/>
+              <a:buAutoNum type="arabicPeriod"/>
+            </a:pPr>
+            <a:r>
+              <a:rPr lang="it-IT" sz="2000" dirty="0" err="1"/>
+              <a:t>structural</a:t>
+            </a:r>
+            <a:r>
+              <a:rPr lang="it-IT" sz="2000" dirty="0"/>
+              <a:t> </a:t>
+            </a:r>
+            <a:r>
+              <a:rPr lang="it-IT" sz="2000" dirty="0" err="1"/>
+              <a:t>equation</a:t>
+            </a:r>
+            <a:r>
+              <a:rPr lang="it-IT" sz="2000" dirty="0"/>
+              <a:t> </a:t>
+            </a:r>
+            <a:r>
+              <a:rPr lang="it-IT" sz="2000" dirty="0" err="1"/>
+              <a:t>modelling</a:t>
+            </a:r>
+            <a:r>
+              <a:rPr lang="it-IT" sz="2000" dirty="0"/>
+              <a:t> (R package </a:t>
+            </a:r>
+            <a:r>
+              <a:rPr lang="it-IT" sz="2000" dirty="0" err="1">
+                <a:solidFill>
+                  <a:schemeClr val="accent1"/>
+                </a:solidFill>
+              </a:rPr>
+              <a:t>lavaan</a:t>
+            </a:r>
+            <a:r>
+              <a:rPr lang="it-IT" sz="2000" dirty="0"/>
+              <a:t>)</a:t>
+            </a:r>
+          </a:p>
+          <a:p>
+            <a:pPr marL="0" indent="0">
+              <a:buNone/>
+            </a:pPr>
+            <a:endParaRPr lang="it-IT" sz="2000" dirty="0"/>
+          </a:p>
+          <a:p>
+            <a:pPr marL="0" indent="0">
+              <a:buNone/>
+            </a:pPr>
+            <a:endParaRPr lang="it-IT" sz="2000" dirty="0"/>
+          </a:p>
+          <a:p>
+            <a:pPr marL="0" indent="0">
+              <a:buNone/>
+            </a:pPr>
+            <a:r>
+              <a:rPr lang="it-IT" sz="2000" dirty="0" err="1"/>
+              <a:t>Boosted</a:t>
+            </a:r>
+            <a:r>
+              <a:rPr lang="it-IT" sz="2000" dirty="0"/>
+              <a:t> </a:t>
+            </a:r>
+            <a:r>
+              <a:rPr lang="it-IT" sz="2000" dirty="0" err="1"/>
+              <a:t>Regression</a:t>
+            </a:r>
+            <a:r>
+              <a:rPr lang="it-IT" sz="2000" dirty="0"/>
+              <a:t> </a:t>
+            </a:r>
+            <a:r>
+              <a:rPr lang="it-IT" sz="2000" dirty="0" err="1"/>
+              <a:t>Trees</a:t>
+            </a:r>
+            <a:r>
+              <a:rPr lang="it-IT" sz="2000" dirty="0"/>
+              <a:t> (</a:t>
+            </a:r>
+            <a:r>
+              <a:rPr lang="it-IT" sz="2000" dirty="0" err="1"/>
+              <a:t>eXtreme</a:t>
+            </a:r>
+            <a:r>
+              <a:rPr lang="it-IT" sz="2000" dirty="0"/>
+              <a:t> </a:t>
+            </a:r>
+            <a:r>
+              <a:rPr lang="it-IT" sz="2000" dirty="0" err="1"/>
+              <a:t>Gradient</a:t>
+            </a:r>
+            <a:r>
+              <a:rPr lang="it-IT" sz="2000" dirty="0"/>
+              <a:t> </a:t>
+            </a:r>
+            <a:r>
+              <a:rPr lang="it-IT" sz="2000" dirty="0" err="1"/>
+              <a:t>Boosting</a:t>
+            </a:r>
+            <a:r>
+              <a:rPr lang="it-IT" sz="2000" dirty="0"/>
+              <a:t>, R package </a:t>
+            </a:r>
+            <a:r>
+              <a:rPr lang="it-IT" sz="2000" dirty="0" err="1">
+                <a:solidFill>
+                  <a:schemeClr val="accent1"/>
+                </a:solidFill>
+              </a:rPr>
+              <a:t>XGBoost</a:t>
+            </a:r>
+            <a:r>
+              <a:rPr lang="it-IT" sz="2000" dirty="0"/>
+              <a:t>)</a:t>
+            </a:r>
+          </a:p>
+          <a:p>
+            <a:r>
+              <a:rPr lang="it-IT" sz="2000" dirty="0" err="1"/>
+              <a:t>variable</a:t>
+            </a:r>
+            <a:r>
+              <a:rPr lang="it-IT" sz="2000" dirty="0"/>
+              <a:t> </a:t>
+            </a:r>
+            <a:r>
+              <a:rPr lang="it-IT" sz="2000" dirty="0" err="1"/>
+              <a:t>importance</a:t>
+            </a:r>
+            <a:endParaRPr lang="it-IT" sz="2000" dirty="0"/>
+          </a:p>
+          <a:p>
+            <a:r>
+              <a:rPr lang="it-IT" sz="2000" dirty="0" err="1"/>
+              <a:t>prediction</a:t>
+            </a:r>
+            <a:endParaRPr lang="it-IT" sz="2000" dirty="0"/>
+          </a:p>
+        </p:txBody>
+      </p:sp>
+    </p:spTree>
+    <p:extLst>
+      <p:ext uri="{BB962C8B-B14F-4D97-AF65-F5344CB8AC3E}">
+        <p14:creationId xmlns:p14="http://schemas.microsoft.com/office/powerpoint/2010/main" val="4074630262"/>
+      </p:ext>
+    </p:extLst>
+  </p:cSld>
+  <p:clrMapOvr>
+    <a:masterClrMapping/>
+  </p:clrMapOvr>
+</p:sld>
+</file>
+
+<file path=ppt/slides/slide6.xml><?xml version="1.0" encoding="utf-8"?>
+<p:sld xmlns:a="http://schemas.openxmlformats.org/drawingml/2006/main" xmlns:r="http://schemas.openxmlformats.org/officeDocument/2006/relationships" xmlns:p="http://schemas.openxmlformats.org/presentationml/2006/main">
+  <p:cSld>
+    <p:spTree>
+      <p:nvGrpSpPr>
+        <p:cNvPr id="1" name=""/>
+        <p:cNvGrpSpPr/>
+        <p:nvPr/>
+      </p:nvGrpSpPr>
+      <p:grpSpPr>
+        <a:xfrm>
+          <a:off x="0" y="0"/>
+          <a:ext cx="0" cy="0"/>
+          <a:chOff x="0" y="0"/>
+          <a:chExt cx="0" cy="0"/>
+        </a:xfrm>
+      </p:grpSpPr>
+      <p:sp>
+        <p:nvSpPr>
+          <p:cNvPr id="2" name="Titolo 1">
+            <a:extLst>
+              <a:ext uri="{FF2B5EF4-FFF2-40B4-BE49-F238E27FC236}">
+                <a16:creationId xmlns:a16="http://schemas.microsoft.com/office/drawing/2014/main" id="{24A9520D-548A-2B4B-2494-ABF3AF7CCB6B}"/>
+              </a:ext>
+            </a:extLst>
+          </p:cNvPr>
+          <p:cNvSpPr>
+            <a:spLocks noGrp="1"/>
+          </p:cNvSpPr>
+          <p:nvPr>
+            <p:ph type="title"/>
+          </p:nvPr>
+        </p:nvSpPr>
+        <p:spPr>
+          <a:xfrm>
+            <a:off x="838200" y="365125"/>
+            <a:ext cx="10515600" cy="977627"/>
+          </a:xfrm>
+        </p:spPr>
+        <p:txBody>
+          <a:bodyPr/>
+          <a:lstStyle/>
+          <a:p>
+            <a:r>
+              <a:rPr lang="it-IT" dirty="0" err="1"/>
+              <a:t>Predictors</a:t>
+            </a:r>
+            <a:endParaRPr lang="it-IT" dirty="0"/>
+          </a:p>
+        </p:txBody>
+      </p:sp>
+      <p:sp>
+        <p:nvSpPr>
+          <p:cNvPr id="3" name="Segnaposto contenuto 2">
+            <a:extLst>
+              <a:ext uri="{FF2B5EF4-FFF2-40B4-BE49-F238E27FC236}">
+                <a16:creationId xmlns:a16="http://schemas.microsoft.com/office/drawing/2014/main" id="{792F9517-2B63-27E0-67E7-20B1DFC2533A}"/>
+              </a:ext>
+            </a:extLst>
+          </p:cNvPr>
+          <p:cNvSpPr>
+            <a:spLocks noGrp="1"/>
+          </p:cNvSpPr>
+          <p:nvPr>
+            <p:ph idx="1"/>
+          </p:nvPr>
+        </p:nvSpPr>
+        <p:spPr>
+          <a:xfrm>
+            <a:off x="838200" y="1421394"/>
+            <a:ext cx="10515600" cy="4755569"/>
+          </a:xfrm>
+        </p:spPr>
+        <p:txBody>
+          <a:bodyPr>
+            <a:noAutofit/>
+          </a:bodyPr>
+          <a:lstStyle/>
+          <a:p>
+            <a:r>
+              <a:rPr lang="it-IT" sz="2400" i="1" dirty="0"/>
+              <a:t>Degree-days</a:t>
+            </a:r>
+            <a:r>
+              <a:rPr lang="it-IT" sz="2400" dirty="0"/>
+              <a:t>: </a:t>
+            </a:r>
+            <a:r>
+              <a:rPr lang="it-IT" sz="2400" dirty="0" err="1"/>
+              <a:t>between</a:t>
+            </a:r>
+            <a:r>
+              <a:rPr lang="it-IT" sz="2400" dirty="0"/>
+              <a:t> </a:t>
+            </a:r>
+            <a:r>
+              <a:rPr lang="it-IT" sz="2400" dirty="0" err="1"/>
+              <a:t>snowmelt</a:t>
+            </a:r>
+            <a:r>
+              <a:rPr lang="it-IT" sz="2400" dirty="0"/>
+              <a:t> day up to </a:t>
+            </a:r>
+            <a:r>
+              <a:rPr lang="it-IT" sz="2400" dirty="0">
+                <a:solidFill>
+                  <a:schemeClr val="accent1"/>
+                </a:solidFill>
+              </a:rPr>
+              <a:t>150 </a:t>
+            </a:r>
+            <a:r>
+              <a:rPr lang="it-IT" sz="2400" dirty="0"/>
+              <a:t>days </a:t>
+            </a:r>
+            <a:r>
+              <a:rPr lang="it-IT" sz="2400" dirty="0" err="1"/>
+              <a:t>later</a:t>
+            </a:r>
+            <a:endParaRPr lang="it-IT" sz="2400" dirty="0"/>
+          </a:p>
+          <a:p>
+            <a:r>
+              <a:rPr lang="it-IT" sz="2400" i="1" dirty="0"/>
+              <a:t>num_sp_Tmin_10</a:t>
+            </a:r>
+            <a:br>
+              <a:rPr lang="it-IT" sz="2400" i="1" dirty="0"/>
+            </a:br>
+            <a:r>
+              <a:rPr lang="it-IT" sz="2400" i="1" dirty="0"/>
+              <a:t>num_sp_Tmin_15</a:t>
+            </a:r>
+            <a:br>
+              <a:rPr lang="it-IT" sz="2400" i="1" dirty="0"/>
+            </a:br>
+            <a:r>
+              <a:rPr lang="it-IT" sz="2400" i="1" dirty="0"/>
+              <a:t>num_sp_Tmax_25</a:t>
+            </a:r>
+            <a:br>
+              <a:rPr lang="it-IT" sz="2400" i="1" dirty="0"/>
+            </a:br>
+            <a:r>
+              <a:rPr lang="it-IT" sz="2400" i="1" dirty="0"/>
+              <a:t>num_sp_Tmax_30</a:t>
+            </a:r>
+          </a:p>
+          <a:p>
+            <a:r>
+              <a:rPr lang="it-IT" sz="2400" i="1" dirty="0"/>
+              <a:t>num_sd_Tmin_10</a:t>
+            </a:r>
+            <a:br>
+              <a:rPr lang="it-IT" sz="2400" i="1" dirty="0"/>
+            </a:br>
+            <a:r>
+              <a:rPr lang="it-IT" sz="2400" i="1" dirty="0"/>
+              <a:t>num_sd_Tmin_15</a:t>
+            </a:r>
+            <a:br>
+              <a:rPr lang="it-IT" sz="2400" i="1" dirty="0"/>
+            </a:br>
+            <a:r>
+              <a:rPr lang="it-IT" sz="2400" i="1" dirty="0"/>
+              <a:t>num_sd_Tmax_25</a:t>
+            </a:r>
+            <a:br>
+              <a:rPr lang="it-IT" sz="2400" i="1" dirty="0"/>
+            </a:br>
+            <a:r>
+              <a:rPr lang="it-IT" sz="2400" i="1" dirty="0"/>
+              <a:t>num_sd_Tmax_30</a:t>
+            </a:r>
+          </a:p>
+          <a:p>
+            <a:r>
+              <a:rPr lang="it-IT" sz="2400" i="1" dirty="0"/>
+              <a:t>Site</a:t>
+            </a:r>
+          </a:p>
+          <a:p>
+            <a:r>
+              <a:rPr lang="it-IT" sz="2400" i="1" dirty="0"/>
+              <a:t>State (J, V, F)</a:t>
+            </a:r>
+            <a:endParaRPr lang="it-IT" dirty="0"/>
+          </a:p>
+          <a:p>
+            <a:endParaRPr lang="it-IT" dirty="0"/>
+          </a:p>
+        </p:txBody>
+      </p:sp>
+      <p:sp>
+        <p:nvSpPr>
+          <p:cNvPr id="5" name="CasellaDiTesto 4">
+            <a:extLst>
+              <a:ext uri="{FF2B5EF4-FFF2-40B4-BE49-F238E27FC236}">
+                <a16:creationId xmlns:a16="http://schemas.microsoft.com/office/drawing/2014/main" id="{F53BC702-AB79-35C2-4659-56E9862F5546}"/>
+              </a:ext>
+            </a:extLst>
+          </p:cNvPr>
+          <p:cNvSpPr txBox="1"/>
+          <p:nvPr/>
+        </p:nvSpPr>
+        <p:spPr>
+          <a:xfrm>
+            <a:off x="4684861" y="2105595"/>
+            <a:ext cx="5699466" cy="1015663"/>
+          </a:xfrm>
+          <a:prstGeom prst="rect">
+            <a:avLst/>
+          </a:prstGeom>
+          <a:noFill/>
+        </p:spPr>
+        <p:txBody>
+          <a:bodyPr wrap="square" rtlCol="0">
+            <a:spAutoFit/>
+          </a:bodyPr>
+          <a:lstStyle/>
+          <a:p>
+            <a:r>
+              <a:rPr lang="it-IT" sz="2000" dirty="0" err="1"/>
+              <a:t>Number</a:t>
+            </a:r>
+            <a:r>
+              <a:rPr lang="it-IT" sz="2000" dirty="0"/>
+              <a:t> of </a:t>
+            </a:r>
+            <a:r>
+              <a:rPr lang="it-IT" sz="2000" dirty="0" err="1"/>
+              <a:t>stressful</a:t>
+            </a:r>
+            <a:r>
+              <a:rPr lang="it-IT" sz="2000" dirty="0"/>
+              <a:t> hot </a:t>
+            </a:r>
+            <a:r>
+              <a:rPr lang="it-IT" sz="2000" dirty="0" err="1">
+                <a:solidFill>
+                  <a:srgbClr val="FF0000"/>
+                </a:solidFill>
+              </a:rPr>
+              <a:t>periods</a:t>
+            </a:r>
+            <a:r>
+              <a:rPr lang="it-IT" sz="2000" dirty="0"/>
+              <a:t>:</a:t>
+            </a:r>
+            <a:br>
+              <a:rPr lang="it-IT" sz="2000" dirty="0"/>
+            </a:br>
+            <a:r>
+              <a:rPr lang="it-IT" sz="2000" dirty="0" err="1"/>
+              <a:t>number</a:t>
+            </a:r>
+            <a:r>
+              <a:rPr lang="it-IT" sz="2000" dirty="0"/>
+              <a:t> of </a:t>
+            </a:r>
+            <a:r>
+              <a:rPr lang="it-IT" sz="2000" dirty="0" err="1"/>
+              <a:t>periods</a:t>
+            </a:r>
+            <a:r>
+              <a:rPr lang="it-IT" sz="2000" dirty="0"/>
+              <a:t> with </a:t>
+            </a:r>
+            <a:r>
+              <a:rPr lang="it-IT" sz="2000" dirty="0" err="1"/>
+              <a:t>at</a:t>
+            </a:r>
+            <a:r>
+              <a:rPr lang="it-IT" sz="2000" dirty="0"/>
+              <a:t> </a:t>
+            </a:r>
+            <a:r>
+              <a:rPr lang="it-IT" sz="2000" dirty="0" err="1"/>
+              <a:t>least</a:t>
+            </a:r>
+            <a:r>
+              <a:rPr lang="it-IT" sz="2000" dirty="0"/>
+              <a:t> </a:t>
+            </a:r>
+            <a:r>
+              <a:rPr lang="it-IT" sz="2000" dirty="0">
+                <a:solidFill>
+                  <a:srgbClr val="FF0000"/>
+                </a:solidFill>
+              </a:rPr>
+              <a:t>3</a:t>
+            </a:r>
+            <a:r>
+              <a:rPr lang="it-IT" sz="2000" dirty="0"/>
+              <a:t> consecutive days with </a:t>
+            </a:r>
+            <a:r>
+              <a:rPr lang="it-IT" sz="2000" dirty="0" err="1"/>
+              <a:t>Tmin</a:t>
+            </a:r>
+            <a:r>
+              <a:rPr lang="it-IT" sz="2000" dirty="0"/>
+              <a:t> or </a:t>
+            </a:r>
+            <a:r>
+              <a:rPr lang="it-IT" sz="2000" dirty="0" err="1"/>
+              <a:t>Tmax</a:t>
+            </a:r>
+            <a:r>
+              <a:rPr lang="it-IT" sz="2000" dirty="0"/>
+              <a:t> </a:t>
+            </a:r>
+            <a:r>
+              <a:rPr lang="it-IT" sz="2000" dirty="0" err="1"/>
+              <a:t>above</a:t>
+            </a:r>
+            <a:r>
+              <a:rPr lang="it-IT" sz="2000" dirty="0"/>
+              <a:t> a </a:t>
+            </a:r>
+            <a:r>
+              <a:rPr lang="it-IT" sz="2000" dirty="0" err="1"/>
+              <a:t>threshold</a:t>
+            </a:r>
+            <a:endParaRPr lang="it-IT" sz="2000" dirty="0"/>
+          </a:p>
+        </p:txBody>
+      </p:sp>
+      <p:sp>
+        <p:nvSpPr>
+          <p:cNvPr id="6" name="CasellaDiTesto 5">
+            <a:extLst>
+              <a:ext uri="{FF2B5EF4-FFF2-40B4-BE49-F238E27FC236}">
+                <a16:creationId xmlns:a16="http://schemas.microsoft.com/office/drawing/2014/main" id="{8A6793C6-B70E-66DD-C8FF-1D50FBD833F3}"/>
+              </a:ext>
+            </a:extLst>
+          </p:cNvPr>
+          <p:cNvSpPr txBox="1"/>
+          <p:nvPr/>
+        </p:nvSpPr>
+        <p:spPr>
+          <a:xfrm>
+            <a:off x="4684861" y="3438800"/>
+            <a:ext cx="6686295" cy="1015663"/>
+          </a:xfrm>
+          <a:prstGeom prst="rect">
+            <a:avLst/>
+          </a:prstGeom>
+          <a:noFill/>
+        </p:spPr>
+        <p:txBody>
+          <a:bodyPr wrap="square" rtlCol="0">
+            <a:spAutoFit/>
+          </a:bodyPr>
+          <a:lstStyle/>
+          <a:p>
+            <a:r>
+              <a:rPr lang="it-IT" sz="2000" dirty="0" err="1"/>
+              <a:t>Number</a:t>
+            </a:r>
+            <a:r>
+              <a:rPr lang="it-IT" sz="2000" dirty="0"/>
+              <a:t> of </a:t>
+            </a:r>
+            <a:r>
+              <a:rPr lang="it-IT" sz="2000" dirty="0" err="1"/>
+              <a:t>stressful</a:t>
+            </a:r>
+            <a:r>
+              <a:rPr lang="it-IT" sz="2000" dirty="0"/>
+              <a:t> hot </a:t>
+            </a:r>
+            <a:r>
+              <a:rPr lang="it-IT" sz="2000" dirty="0">
+                <a:solidFill>
+                  <a:srgbClr val="FF0000"/>
+                </a:solidFill>
+              </a:rPr>
+              <a:t>days</a:t>
+            </a:r>
+            <a:r>
+              <a:rPr lang="it-IT" sz="2000" dirty="0"/>
+              <a:t>:</a:t>
+            </a:r>
+            <a:br>
+              <a:rPr lang="it-IT" sz="2000" dirty="0"/>
+            </a:br>
+            <a:r>
+              <a:rPr lang="it-IT" sz="2000" dirty="0" err="1"/>
+              <a:t>number</a:t>
+            </a:r>
+            <a:r>
+              <a:rPr lang="it-IT" sz="2000" dirty="0"/>
+              <a:t> of days in </a:t>
+            </a:r>
+            <a:r>
+              <a:rPr lang="it-IT" sz="2000" dirty="0" err="1"/>
+              <a:t>periods</a:t>
+            </a:r>
+            <a:r>
+              <a:rPr lang="it-IT" sz="2000" dirty="0"/>
+              <a:t> with </a:t>
+            </a:r>
+            <a:r>
+              <a:rPr lang="it-IT" sz="2000" dirty="0" err="1"/>
+              <a:t>at</a:t>
+            </a:r>
+            <a:r>
+              <a:rPr lang="it-IT" sz="2000" dirty="0"/>
+              <a:t> </a:t>
+            </a:r>
+            <a:r>
+              <a:rPr lang="it-IT" sz="2000" dirty="0" err="1"/>
+              <a:t>least</a:t>
+            </a:r>
+            <a:r>
+              <a:rPr lang="it-IT" sz="2000" dirty="0"/>
+              <a:t> </a:t>
+            </a:r>
+            <a:r>
+              <a:rPr lang="it-IT" sz="2000" dirty="0">
+                <a:solidFill>
+                  <a:srgbClr val="FF0000"/>
+                </a:solidFill>
+              </a:rPr>
+              <a:t>3</a:t>
+            </a:r>
+            <a:r>
+              <a:rPr lang="it-IT" sz="2000" dirty="0"/>
+              <a:t> consecutive days with </a:t>
+            </a:r>
+            <a:r>
+              <a:rPr lang="it-IT" sz="2000" dirty="0" err="1"/>
+              <a:t>Tmin</a:t>
+            </a:r>
+            <a:r>
+              <a:rPr lang="it-IT" sz="2000" dirty="0"/>
+              <a:t> or </a:t>
+            </a:r>
+            <a:r>
+              <a:rPr lang="it-IT" sz="2000" dirty="0" err="1"/>
+              <a:t>Tmax</a:t>
+            </a:r>
+            <a:r>
+              <a:rPr lang="it-IT" sz="2000" dirty="0"/>
+              <a:t> </a:t>
+            </a:r>
+            <a:r>
+              <a:rPr lang="it-IT" sz="2000" dirty="0" err="1"/>
+              <a:t>above</a:t>
+            </a:r>
+            <a:r>
+              <a:rPr lang="it-IT" sz="2000" dirty="0"/>
+              <a:t> a </a:t>
+            </a:r>
+            <a:r>
+              <a:rPr lang="it-IT" sz="2000" dirty="0" err="1"/>
+              <a:t>threshold</a:t>
+            </a:r>
+            <a:endParaRPr lang="it-IT" sz="2000" dirty="0"/>
+          </a:p>
+        </p:txBody>
+      </p:sp>
+      <p:sp>
+        <p:nvSpPr>
+          <p:cNvPr id="7" name="Parentesi graffa chiusa 6">
+            <a:extLst>
+              <a:ext uri="{FF2B5EF4-FFF2-40B4-BE49-F238E27FC236}">
+                <a16:creationId xmlns:a16="http://schemas.microsoft.com/office/drawing/2014/main" id="{0FB798B6-7B1D-3677-0BD9-308276F4B854}"/>
+              </a:ext>
+            </a:extLst>
+          </p:cNvPr>
+          <p:cNvSpPr/>
+          <p:nvPr/>
+        </p:nvSpPr>
+        <p:spPr>
+          <a:xfrm>
+            <a:off x="3911853" y="1984210"/>
+            <a:ext cx="280657" cy="1311256"/>
+          </a:xfrm>
+          <a:prstGeom prst="rightBrace">
+            <a:avLst/>
+          </a:prstGeom>
+        </p:spPr>
+        <p:style>
+          <a:lnRef idx="1">
+            <a:schemeClr val="dk1"/>
+          </a:lnRef>
+          <a:fillRef idx="0">
+            <a:schemeClr val="dk1"/>
+          </a:fillRef>
+          <a:effectRef idx="0">
+            <a:schemeClr val="dk1"/>
+          </a:effectRef>
+          <a:fontRef idx="minor">
+            <a:schemeClr val="tx1"/>
+          </a:fontRef>
+        </p:style>
+        <p:txBody>
+          <a:bodyPr rtlCol="0" anchor="ctr"/>
+          <a:lstStyle/>
+          <a:p>
+            <a:pPr algn="ctr"/>
+            <a:endParaRPr lang="it-IT"/>
+          </a:p>
+        </p:txBody>
+      </p:sp>
+      <p:sp>
+        <p:nvSpPr>
+          <p:cNvPr id="8" name="Parentesi graffa chiusa 7">
+            <a:extLst>
+              <a:ext uri="{FF2B5EF4-FFF2-40B4-BE49-F238E27FC236}">
+                <a16:creationId xmlns:a16="http://schemas.microsoft.com/office/drawing/2014/main" id="{11DAECF5-2AC2-7DFF-0D88-BF4B4DB24190}"/>
+              </a:ext>
+            </a:extLst>
+          </p:cNvPr>
+          <p:cNvSpPr/>
+          <p:nvPr/>
+        </p:nvSpPr>
+        <p:spPr>
+          <a:xfrm>
+            <a:off x="3885446" y="3445661"/>
+            <a:ext cx="280657" cy="1311256"/>
+          </a:xfrm>
+          <a:prstGeom prst="rightBrace">
+            <a:avLst/>
+          </a:prstGeom>
+        </p:spPr>
+        <p:style>
+          <a:lnRef idx="1">
+            <a:schemeClr val="dk1"/>
+          </a:lnRef>
+          <a:fillRef idx="0">
+            <a:schemeClr val="dk1"/>
+          </a:fillRef>
+          <a:effectRef idx="0">
+            <a:schemeClr val="dk1"/>
+          </a:effectRef>
+          <a:fontRef idx="minor">
+            <a:schemeClr val="tx1"/>
+          </a:fontRef>
+        </p:style>
+        <p:txBody>
+          <a:bodyPr rtlCol="0" anchor="ctr"/>
+          <a:lstStyle/>
+          <a:p>
+            <a:pPr algn="ctr"/>
+            <a:endParaRPr lang="it-IT"/>
+          </a:p>
+        </p:txBody>
+      </p:sp>
+    </p:spTree>
+    <p:extLst>
+      <p:ext uri="{BB962C8B-B14F-4D97-AF65-F5344CB8AC3E}">
+        <p14:creationId xmlns:p14="http://schemas.microsoft.com/office/powerpoint/2010/main" val="3140617985"/>
+      </p:ext>
+    </p:extLst>
+  </p:cSld>
+  <p:clrMapOvr>
+    <a:masterClrMapping/>
+  </p:clrMapOvr>
+</p:sld>
+</file>
+
+<file path=ppt/slides/slide7.xml><?xml version="1.0" encoding="utf-8"?>
+<p:sld xmlns:a="http://schemas.openxmlformats.org/drawingml/2006/main" xmlns:r="http://schemas.openxmlformats.org/officeDocument/2006/relationships" xmlns:p="http://schemas.openxmlformats.org/presentationml/2006/main">
+  <p:cSld>
+    <p:spTree>
+      <p:nvGrpSpPr>
+        <p:cNvPr id="1" name=""/>
+        <p:cNvGrpSpPr/>
+        <p:nvPr/>
+      </p:nvGrpSpPr>
+      <p:grpSpPr>
+        <a:xfrm>
+          <a:off x="0" y="0"/>
+          <a:ext cx="0" cy="0"/>
+          <a:chOff x="0" y="0"/>
+          <a:chExt cx="0" cy="0"/>
+        </a:xfrm>
+      </p:grpSpPr>
+      <p:sp>
+        <p:nvSpPr>
+          <p:cNvPr id="2" name="Titolo 1">
+            <a:extLst>
+              <a:ext uri="{FF2B5EF4-FFF2-40B4-BE49-F238E27FC236}">
+                <a16:creationId xmlns:a16="http://schemas.microsoft.com/office/drawing/2014/main" id="{24A9520D-548A-2B4B-2494-ABF3AF7CCB6B}"/>
+              </a:ext>
+            </a:extLst>
+          </p:cNvPr>
+          <p:cNvSpPr>
+            <a:spLocks noGrp="1"/>
+          </p:cNvSpPr>
+          <p:nvPr>
+            <p:ph type="title"/>
+          </p:nvPr>
+        </p:nvSpPr>
+        <p:spPr/>
+        <p:txBody>
+          <a:bodyPr/>
+          <a:lstStyle/>
+          <a:p>
+            <a:r>
+              <a:rPr lang="it-IT" dirty="0"/>
+              <a:t>Survival </a:t>
+            </a:r>
+            <a:r>
+              <a:rPr lang="it-IT" dirty="0" err="1"/>
+              <a:t>probability</a:t>
+            </a:r>
+            <a:r>
+              <a:rPr lang="it-IT" dirty="0"/>
+              <a:t>		</a:t>
+            </a:r>
+            <a:r>
+              <a:rPr lang="it-IT" dirty="0" err="1"/>
+              <a:t>Flowering</a:t>
+            </a:r>
+            <a:r>
+              <a:rPr lang="it-IT" dirty="0"/>
+              <a:t> </a:t>
+            </a:r>
+            <a:r>
+              <a:rPr lang="it-IT" dirty="0" err="1"/>
+              <a:t>probability</a:t>
+            </a:r>
+            <a:endParaRPr lang="it-IT" dirty="0"/>
+          </a:p>
+        </p:txBody>
+      </p:sp>
+      <p:pic>
+        <p:nvPicPr>
+          <p:cNvPr id="4" name="Immagine 3">
+            <a:extLst>
+              <a:ext uri="{FF2B5EF4-FFF2-40B4-BE49-F238E27FC236}">
+                <a16:creationId xmlns:a16="http://schemas.microsoft.com/office/drawing/2014/main" id="{A6152085-02FE-6374-64AF-C15582C45773}"/>
+              </a:ext>
+            </a:extLst>
+          </p:cNvPr>
+          <p:cNvPicPr>
+            <a:picLocks noChangeAspect="1"/>
+          </p:cNvPicPr>
+          <p:nvPr/>
+        </p:nvPicPr>
+        <p:blipFill>
+          <a:blip r:embed="rId2"/>
+          <a:stretch>
+            <a:fillRect/>
+          </a:stretch>
+        </p:blipFill>
+        <p:spPr>
+          <a:xfrm>
+            <a:off x="-461982" y="1292548"/>
+            <a:ext cx="6557982" cy="5087136"/>
+          </a:xfrm>
+          <a:prstGeom prst="rect">
+            <a:avLst/>
+          </a:prstGeom>
+          <a:ln>
+            <a:noFill/>
+          </a:ln>
+        </p:spPr>
+      </p:pic>
+      <p:pic>
+        <p:nvPicPr>
+          <p:cNvPr id="5" name="Immagine 4">
+            <a:extLst>
+              <a:ext uri="{FF2B5EF4-FFF2-40B4-BE49-F238E27FC236}">
+                <a16:creationId xmlns:a16="http://schemas.microsoft.com/office/drawing/2014/main" id="{FEA05DBC-71DC-09B2-E0A5-A4F7131BF431}"/>
+              </a:ext>
+            </a:extLst>
+          </p:cNvPr>
+          <p:cNvPicPr>
+            <a:picLocks noChangeAspect="1"/>
+          </p:cNvPicPr>
+          <p:nvPr/>
+        </p:nvPicPr>
+        <p:blipFill>
+          <a:blip r:embed="rId3"/>
+          <a:stretch>
+            <a:fillRect/>
+          </a:stretch>
+        </p:blipFill>
+        <p:spPr>
+          <a:xfrm>
+            <a:off x="5428285" y="1405739"/>
+            <a:ext cx="6557982" cy="5087136"/>
+          </a:xfrm>
+          <a:prstGeom prst="rect">
+            <a:avLst/>
+          </a:prstGeom>
+          <a:ln>
+            <a:noFill/>
+          </a:ln>
+        </p:spPr>
+      </p:pic>
+    </p:spTree>
+    <p:extLst>
+      <p:ext uri="{BB962C8B-B14F-4D97-AF65-F5344CB8AC3E}">
+        <p14:creationId xmlns:p14="http://schemas.microsoft.com/office/powerpoint/2010/main" val="1601549311"/>
+      </p:ext>
+    </p:extLst>
+  </p:cSld>
+  <p:clrMapOvr>
+    <a:masterClrMapping/>
+  </p:clrMapOvr>
+</p:sld>
+</file>
+
+<file path=ppt/slides/slide8.xml><?xml version="1.0" encoding="utf-8"?>
+<p:sld xmlns:a="http://schemas.openxmlformats.org/drawingml/2006/main" xmlns:r="http://schemas.openxmlformats.org/officeDocument/2006/relationships" xmlns:p="http://schemas.openxmlformats.org/presentationml/2006/main">
+  <p:cSld>
+    <p:spTree>
+      <p:nvGrpSpPr>
+        <p:cNvPr id="1" name=""/>
+        <p:cNvGrpSpPr/>
+        <p:nvPr/>
+      </p:nvGrpSpPr>
+      <p:grpSpPr>
+        <a:xfrm>
+          <a:off x="0" y="0"/>
+          <a:ext cx="0" cy="0"/>
+          <a:chOff x="0" y="0"/>
+          <a:chExt cx="0" cy="0"/>
+        </a:xfrm>
+      </p:grpSpPr>
+      <p:sp>
+        <p:nvSpPr>
+          <p:cNvPr id="2" name="Titolo 1">
+            <a:extLst>
+              <a:ext uri="{FF2B5EF4-FFF2-40B4-BE49-F238E27FC236}">
+                <a16:creationId xmlns:a16="http://schemas.microsoft.com/office/drawing/2014/main" id="{24A9520D-548A-2B4B-2494-ABF3AF7CCB6B}"/>
+              </a:ext>
+            </a:extLst>
+          </p:cNvPr>
+          <p:cNvSpPr>
+            <a:spLocks noGrp="1"/>
+          </p:cNvSpPr>
+          <p:nvPr>
+            <p:ph type="title"/>
+          </p:nvPr>
+        </p:nvSpPr>
+        <p:spPr/>
+        <p:txBody>
+          <a:bodyPr/>
+          <a:lstStyle/>
+          <a:p>
+            <a:r>
+              <a:rPr lang="it-IT" dirty="0"/>
+              <a:t>Survival </a:t>
+            </a:r>
+            <a:r>
+              <a:rPr lang="it-IT" dirty="0" err="1"/>
+              <a:t>probability</a:t>
+            </a:r>
+            <a:r>
+              <a:rPr lang="it-IT" dirty="0"/>
+              <a:t>		</a:t>
+            </a:r>
+            <a:r>
+              <a:rPr lang="it-IT" dirty="0" err="1"/>
+              <a:t>Flowering</a:t>
+            </a:r>
+            <a:r>
+              <a:rPr lang="it-IT" dirty="0"/>
+              <a:t> </a:t>
+            </a:r>
+            <a:r>
+              <a:rPr lang="it-IT" dirty="0" err="1"/>
+              <a:t>probability</a:t>
+            </a:r>
+            <a:endParaRPr lang="it-IT" dirty="0"/>
+          </a:p>
+        </p:txBody>
+      </p:sp>
+      <p:pic>
+        <p:nvPicPr>
+          <p:cNvPr id="3" name="Immagine 2">
+            <a:extLst>
+              <a:ext uri="{FF2B5EF4-FFF2-40B4-BE49-F238E27FC236}">
+                <a16:creationId xmlns:a16="http://schemas.microsoft.com/office/drawing/2014/main" id="{FB1A7411-DFC2-02AA-84B6-EB8919558C9D}"/>
+              </a:ext>
+            </a:extLst>
+          </p:cNvPr>
+          <p:cNvPicPr>
+            <a:picLocks noChangeAspect="1"/>
+          </p:cNvPicPr>
+          <p:nvPr/>
+        </p:nvPicPr>
+        <p:blipFill>
+          <a:blip r:embed="rId2"/>
+          <a:stretch>
+            <a:fillRect/>
+          </a:stretch>
+        </p:blipFill>
+        <p:spPr>
+          <a:xfrm>
+            <a:off x="0" y="1586894"/>
+            <a:ext cx="5524500" cy="3495675"/>
+          </a:xfrm>
+          <a:prstGeom prst="rect">
+            <a:avLst/>
+          </a:prstGeom>
+        </p:spPr>
+      </p:pic>
+      <p:pic>
+        <p:nvPicPr>
+          <p:cNvPr id="6" name="Immagine 5">
+            <a:extLst>
+              <a:ext uri="{FF2B5EF4-FFF2-40B4-BE49-F238E27FC236}">
+                <a16:creationId xmlns:a16="http://schemas.microsoft.com/office/drawing/2014/main" id="{0FFB8BD9-81C4-D21F-296D-9664BC4076AD}"/>
+              </a:ext>
+            </a:extLst>
+          </p:cNvPr>
+          <p:cNvPicPr>
+            <a:picLocks noChangeAspect="1"/>
+          </p:cNvPicPr>
+          <p:nvPr/>
+        </p:nvPicPr>
+        <p:blipFill>
+          <a:blip r:embed="rId3"/>
+          <a:stretch>
+            <a:fillRect/>
+          </a:stretch>
+        </p:blipFill>
+        <p:spPr>
+          <a:xfrm>
+            <a:off x="5897840" y="1483199"/>
+            <a:ext cx="5524500" cy="3495675"/>
+          </a:xfrm>
+          <a:prstGeom prst="rect">
+            <a:avLst/>
+          </a:prstGeom>
+        </p:spPr>
+      </p:pic>
+    </p:spTree>
+    <p:extLst>
+      <p:ext uri="{BB962C8B-B14F-4D97-AF65-F5344CB8AC3E}">
+        <p14:creationId xmlns:p14="http://schemas.microsoft.com/office/powerpoint/2010/main" val="634261037"/>
+      </p:ext>
+    </p:extLst>
+  </p:cSld>
+  <p:clrMapOvr>
+    <a:masterClrMapping/>
+  </p:clrMapOvr>
+</p:sld>
+</file>
+
 <file path=ppt/theme/theme1.xml><?xml version="1.0" encoding="utf-8"?>
 <a:theme xmlns:a="http://schemas.openxmlformats.org/drawingml/2006/main" name="Tema di Office">
   <a:themeElements>

</xml_diff>